<commit_message>
added instructor note to 4-26 Fixed highlight boxes throughout
</commit_message>
<xml_diff>
--- a/04-creating-custom-profiles.pptx
+++ b/04-creating-custom-profiles.pptx
@@ -6,10 +6,10 @@
     <p:sldMasterId id="2147483847" r:id="rId6"/>
   </p:sldMasterIdLst>
   <p:notesMasterIdLst>
-    <p:notesMasterId r:id="rId40"/>
+    <p:notesMasterId r:id="rId39"/>
   </p:notesMasterIdLst>
   <p:handoutMasterIdLst>
-    <p:handoutMasterId r:id="rId41"/>
+    <p:handoutMasterId r:id="rId40"/>
   </p:handoutMasterIdLst>
   <p:sldIdLst>
     <p:sldId id="256" r:id="rId7"/>
@@ -40,11 +40,10 @@
     <p:sldId id="312" r:id="rId32"/>
     <p:sldId id="313" r:id="rId33"/>
     <p:sldId id="314" r:id="rId34"/>
-    <p:sldId id="316" r:id="rId35"/>
-    <p:sldId id="296" r:id="rId36"/>
-    <p:sldId id="302" r:id="rId37"/>
-    <p:sldId id="276" r:id="rId38"/>
-    <p:sldId id="267" r:id="rId39"/>
+    <p:sldId id="296" r:id="rId35"/>
+    <p:sldId id="302" r:id="rId36"/>
+    <p:sldId id="276" r:id="rId37"/>
+    <p:sldId id="267" r:id="rId38"/>
   </p:sldIdLst>
   <p:sldSz cx="16256000" cy="9144000"/>
   <p:notesSz cx="6858000" cy="9144000"/>
@@ -306,7 +305,7 @@
               <a:pPr>
                 <a:defRPr/>
               </a:pPr>
-              <a:t>2015-12-15</a:t>
+              <a:t>2015-12-18</a:t>
             </a:fld>
             <a:endParaRPr lang="en-US" dirty="0"/>
           </a:p>
@@ -489,7 +488,7 @@
               <a:pPr>
                 <a:defRPr/>
               </a:pPr>
-              <a:t>2015-12-15</a:t>
+              <a:t>2015-12-18</a:t>
             </a:fld>
             <a:endParaRPr lang="en-US" dirty="0"/>
           </a:p>
@@ -1761,15 +1760,7 @@
             </a:r>
             <a:r>
               <a:rPr lang="en-US" baseline="0" dirty="0" smtClean="0"/>
-              <a:t> file with the control shown here. We've pasted </a:t>
-            </a:r>
-            <a:r>
-              <a:rPr lang="en-US" baseline="0" dirty="0" smtClean="0"/>
-              <a:t>the code below </a:t>
-            </a:r>
-            <a:r>
-              <a:rPr lang="en-US" baseline="0" dirty="0" smtClean="0"/>
-              <a:t>so you can see it better.</a:t>
+              <a:t> file with the control shown here. We've pasted the code below so you can see it better.</a:t>
             </a:r>
             <a:endParaRPr lang="en-US" dirty="0" smtClean="0"/>
           </a:p>
@@ -2927,11 +2918,7 @@
             </a:pPr>
             <a:r>
               <a:rPr lang="en-US" dirty="0" smtClean="0"/>
-              <a:t>run </a:t>
-            </a:r>
-            <a:r>
-              <a:rPr lang="en-US" dirty="0" smtClean="0"/>
-              <a:t>`</a:t>
+              <a:t>run `</a:t>
             </a:r>
             <a:r>
               <a:rPr lang="en-US" dirty="0" err="1" smtClean="0"/>
@@ -4601,7 +4588,7 @@
             </a:r>
             <a:r>
               <a:rPr lang="en-US" baseline="0" dirty="0" smtClean="0"/>
-              <a:t>the compliance team may have improved that Compliance profile name field on the Scan nodes page by now to include whatever is the </a:t>
+              <a:t>the compliance team may have improved that Compliance profile name field on the "Scan nodes" page by now to include whatever is the </a:t>
             </a:r>
             <a:r>
               <a:rPr lang="en-US" dirty="0" smtClean="0">
@@ -5077,17 +5064,255 @@
         <p:spPr/>
         <p:txBody>
           <a:bodyPr>
-            <a:normAutofit/>
+            <a:normAutofit fontScale="92500" lnSpcReduction="20000"/>
           </a:bodyPr>
           <a:lstStyle/>
           <a:p>
+            <a:r>
+              <a:rPr lang="en-US" dirty="0" smtClean="0"/>
+              <a:t>https://github.com/chef/inspec/blob/7f555b902d6860ffe236ff23e4b52f20bac28adc/lib/inspec/profile.rb#L81-L129</a:t>
+            </a:r>
+          </a:p>
+          <a:p>
             <a:endParaRPr lang="en-US" dirty="0" smtClean="0"/>
           </a:p>
           <a:p>
+            <a:pPr marL="0" marR="0" indent="0" algn="l" defTabSz="1217613" rtl="0" eaLnBrk="1" fontAlgn="base" latinLnBrk="0" hangingPunct="1">
+              <a:lnSpc>
+                <a:spcPct val="90000"/>
+              </a:lnSpc>
+              <a:spcBef>
+                <a:spcPct val="30000"/>
+              </a:spcBef>
+              <a:spcAft>
+                <a:spcPts val="450"/>
+              </a:spcAft>
+              <a:buClrTx/>
+              <a:buSzTx/>
+              <a:buFontTx/>
+              <a:buNone/>
+              <a:tabLst/>
+              <a:defRPr/>
+            </a:pPr>
+            <a:r>
+              <a:rPr lang="en-US" dirty="0" smtClean="0"/>
+              <a:t>So your</a:t>
+            </a:r>
+            <a:r>
+              <a:rPr lang="en-US" baseline="0" dirty="0" smtClean="0"/>
+              <a:t> cookbooks will have a </a:t>
+            </a:r>
+            <a:r>
+              <a:rPr lang="en-US" dirty="0" smtClean="0"/>
+              <a:t>metadata.rb.</a:t>
+            </a:r>
+            <a:endParaRPr lang="en-US" dirty="0"/>
+          </a:p>
+          <a:p>
+            <a:pPr marL="0" marR="0" indent="0" algn="l" defTabSz="1217613" rtl="0" eaLnBrk="1" fontAlgn="base" latinLnBrk="0" hangingPunct="1">
+              <a:lnSpc>
+                <a:spcPct val="90000"/>
+              </a:lnSpc>
+              <a:spcBef>
+                <a:spcPct val="30000"/>
+              </a:spcBef>
+              <a:spcAft>
+                <a:spcPts val="450"/>
+              </a:spcAft>
+              <a:buClrTx/>
+              <a:buSzTx/>
+              <a:buFontTx/>
+              <a:buNone/>
+              <a:tabLst/>
+              <a:defRPr/>
+            </a:pPr>
+            <a:r>
+              <a:rPr lang="en-US" dirty="0" smtClean="0"/>
+              <a:t>An</a:t>
+            </a:r>
+            <a:r>
+              <a:rPr lang="en-US" baseline="0" dirty="0" smtClean="0"/>
+              <a:t>d your </a:t>
+            </a:r>
+          </a:p>
+          <a:p>
+            <a:pPr marL="0" marR="0" indent="0" algn="l" defTabSz="1217613" rtl="0" eaLnBrk="1" fontAlgn="base" latinLnBrk="0" hangingPunct="1">
+              <a:lnSpc>
+                <a:spcPct val="90000"/>
+              </a:lnSpc>
+              <a:spcBef>
+                <a:spcPct val="30000"/>
+              </a:spcBef>
+              <a:spcAft>
+                <a:spcPts val="450"/>
+              </a:spcAft>
+              <a:buClrTx/>
+              <a:buSzTx/>
+              <a:buFontTx/>
+              <a:buNone/>
+              <a:tabLst/>
+              <a:defRPr/>
+            </a:pPr>
+            <a:endParaRPr lang="en-US" baseline="0" dirty="0" smtClean="0"/>
+          </a:p>
+          <a:p>
+            <a:r>
+              <a:rPr lang="en-US" sz="1200" b="1" i="0" kern="1200" dirty="0" smtClean="0">
+                <a:solidFill>
+                  <a:schemeClr val="tx1"/>
+                </a:solidFill>
+                <a:effectLst/>
+                <a:latin typeface="Arial" panose="020B0604020202020204" pitchFamily="34" charset="0"/>
+                <a:ea typeface="ＭＳ Ｐゴシック" charset="0"/>
+                <a:cs typeface="Arial" panose="020B0604020202020204" pitchFamily="34" charset="0"/>
+              </a:rPr>
+              <a:t>Adding profiles</a:t>
+            </a:r>
+          </a:p>
+          <a:p>
+            <a:r>
+              <a:rPr lang="en-US" sz="1200" b="0" i="0" kern="1200" dirty="0" smtClean="0">
+                <a:solidFill>
+                  <a:schemeClr val="tx1"/>
+                </a:solidFill>
+                <a:effectLst/>
+                <a:latin typeface="Arial" panose="020B0604020202020204" pitchFamily="34" charset="0"/>
+                <a:ea typeface="ＭＳ Ｐゴシック" charset="0"/>
+                <a:cs typeface="Arial" panose="020B0604020202020204" pitchFamily="34" charset="0"/>
+              </a:rPr>
+              <a:t>Compliance profiles must be packaged in to a .tar.gz or .zip file to be uploaded to the Compliance Server. </a:t>
+            </a:r>
+          </a:p>
+          <a:p>
+            <a:r>
+              <a:rPr lang="en-US" sz="1200" b="0" i="0" kern="1200" dirty="0" smtClean="0">
+                <a:solidFill>
+                  <a:schemeClr val="tx1"/>
+                </a:solidFill>
+                <a:effectLst/>
+                <a:latin typeface="Arial" panose="020B0604020202020204" pitchFamily="34" charset="0"/>
+                <a:ea typeface="ＭＳ Ｐゴシック" charset="0"/>
+                <a:cs typeface="Arial" panose="020B0604020202020204" pitchFamily="34" charset="0"/>
+              </a:rPr>
+              <a:t>The directory structure is as follows (note, this is subject to change.  TODO: link to official docs when </a:t>
+            </a:r>
+            <a:r>
+              <a:rPr lang="en-US" sz="1200" b="0" i="0" kern="1200" dirty="0" err="1" smtClean="0">
+                <a:solidFill>
+                  <a:schemeClr val="tx1"/>
+                </a:solidFill>
+                <a:effectLst/>
+                <a:latin typeface="Arial" panose="020B0604020202020204" pitchFamily="34" charset="0"/>
+                <a:ea typeface="ＭＳ Ｐゴシック" charset="0"/>
+                <a:cs typeface="Arial" panose="020B0604020202020204" pitchFamily="34" charset="0"/>
+              </a:rPr>
+              <a:t>avaialble</a:t>
+            </a:r>
+            <a:r>
+              <a:rPr lang="en-US" sz="1200" b="0" i="0" kern="1200" dirty="0" smtClean="0">
+                <a:solidFill>
+                  <a:schemeClr val="tx1"/>
+                </a:solidFill>
+                <a:effectLst/>
+                <a:latin typeface="Arial" panose="020B0604020202020204" pitchFamily="34" charset="0"/>
+                <a:ea typeface="ＭＳ Ｐゴシック" charset="0"/>
+                <a:cs typeface="Arial" panose="020B0604020202020204" pitchFamily="34" charset="0"/>
+              </a:rPr>
+              <a:t>):</a:t>
+            </a:r>
+          </a:p>
+          <a:p>
+            <a:r>
+              <a:rPr lang="en-US" sz="1200" b="0" i="0" kern="1200" dirty="0" smtClean="0">
+                <a:solidFill>
+                  <a:schemeClr val="tx1"/>
+                </a:solidFill>
+                <a:effectLst/>
+                <a:latin typeface="Arial" panose="020B0604020202020204" pitchFamily="34" charset="0"/>
+                <a:ea typeface="ＭＳ Ｐゴシック" charset="0"/>
+                <a:cs typeface="Arial" panose="020B0604020202020204" pitchFamily="34" charset="0"/>
+              </a:rPr>
+              <a:t>xyz.zip:</a:t>
+            </a:r>
+          </a:p>
+          <a:p>
+            <a:r>
+              <a:rPr lang="en-US" dirty="0" smtClean="0"/>
+              <a:t>.</a:t>
+            </a:r>
+            <a:br>
+              <a:rPr lang="en-US" dirty="0" smtClean="0"/>
+            </a:br>
+            <a:r>
+              <a:rPr lang="en-US" dirty="0" smtClean="0"/>
+              <a:t>├── README.md</a:t>
+            </a:r>
+            <a:br>
+              <a:rPr lang="en-US" dirty="0" smtClean="0"/>
+            </a:br>
+            <a:r>
+              <a:rPr lang="en-US" dirty="0" smtClean="0"/>
+              <a:t>├── metadata.rb</a:t>
+            </a:r>
+            <a:br>
+              <a:rPr lang="en-US" dirty="0" smtClean="0"/>
+            </a:br>
+            <a:r>
+              <a:rPr lang="en-US" dirty="0" smtClean="0"/>
+              <a:t>└── test</a:t>
+            </a:r>
+            <a:br>
+              <a:rPr lang="en-US" dirty="0" smtClean="0"/>
+            </a:br>
+            <a:r>
+              <a:rPr lang="en-US" dirty="0" smtClean="0"/>
+              <a:t>  ├── </a:t>
+            </a:r>
+            <a:r>
+              <a:rPr lang="en-US" dirty="0" err="1" smtClean="0"/>
+              <a:t>foo_spec.rb</a:t>
+            </a:r>
+            <a:r>
+              <a:rPr lang="en-US" dirty="0" smtClean="0"/>
+              <a:t/>
+            </a:r>
+            <a:br>
+              <a:rPr lang="en-US" dirty="0" smtClean="0"/>
+            </a:br>
+            <a:r>
+              <a:rPr lang="en-US" dirty="0" smtClean="0"/>
+              <a:t>  └── </a:t>
+            </a:r>
+            <a:r>
+              <a:rPr lang="en-US" dirty="0" err="1" smtClean="0"/>
+              <a:t>bar_spec.rb</a:t>
+            </a:r>
             <a:endParaRPr lang="en-US" dirty="0" smtClean="0"/>
           </a:p>
           <a:p>
             <a:endParaRPr lang="en-US" dirty="0" smtClean="0"/>
+          </a:p>
+          <a:p>
+            <a:r>
+              <a:rPr lang="en-US" dirty="0" smtClean="0"/>
+              <a:t>As you write controls, </a:t>
+            </a:r>
+            <a:r>
+              <a:rPr lang="en-US" dirty="0" err="1" smtClean="0"/>
+              <a:t>InSpec</a:t>
+            </a:r>
+            <a:r>
+              <a:rPr lang="en-US" dirty="0" smtClean="0"/>
+              <a:t> requires a `test` directory since it </a:t>
+            </a:r>
+            <a:r>
+              <a:rPr lang="en-US" dirty="0" err="1" smtClean="0"/>
+              <a:t>InSpec</a:t>
+            </a:r>
+            <a:r>
+              <a:rPr lang="en-US" dirty="0" smtClean="0"/>
+              <a:t> expect this structure.</a:t>
+            </a:r>
           </a:p>
         </p:txBody>
       </p:sp>
@@ -5167,7 +5392,7 @@
     </p:spTree>
     <p:extLst>
       <p:ext uri="{BB962C8B-B14F-4D97-AF65-F5344CB8AC3E}">
-        <p14:creationId xmlns:p14="http://schemas.microsoft.com/office/powerpoint/2010/main" val="2884658786"/>
+        <p14:creationId xmlns:p14="http://schemas.microsoft.com/office/powerpoint/2010/main" val="4234763763"/>
       </p:ext>
     </p:extLst>
   </p:cSld>
@@ -5219,18 +5444,9 @@
         <p:spPr/>
         <p:txBody>
           <a:bodyPr>
-            <a:normAutofit fontScale="92500" lnSpcReduction="20000"/>
+            <a:normAutofit fontScale="70000" lnSpcReduction="20000"/>
           </a:bodyPr>
           <a:lstStyle/>
-          <a:p>
-            <a:r>
-              <a:rPr lang="en-US" dirty="0" smtClean="0"/>
-              <a:t>https://github.com/chef/inspec/blob/7f555b902d6860ffe236ff23e4b52f20bac28adc/lib/inspec/profile.rb#L81-L129</a:t>
-            </a:r>
-          </a:p>
-          <a:p>
-            <a:endParaRPr lang="en-US" dirty="0" smtClean="0"/>
-          </a:p>
           <a:p>
             <a:pPr marL="0" marR="0" indent="0" algn="l" defTabSz="1217613" rtl="0" eaLnBrk="1" fontAlgn="base" latinLnBrk="0" hangingPunct="1">
               <a:lnSpc>
@@ -5251,17 +5467,99 @@
             </a:pPr>
             <a:r>
               <a:rPr lang="en-US" dirty="0" smtClean="0"/>
-              <a:t>So your</a:t>
+              <a:t>The answer is, as you write controls, </a:t>
+            </a:r>
+            <a:r>
+              <a:rPr lang="en-US" dirty="0" err="1" smtClean="0"/>
+              <a:t>InSpec</a:t>
+            </a:r>
+            <a:r>
+              <a:rPr lang="en-US" dirty="0" smtClean="0"/>
+              <a:t> expects a `test` directory at the same</a:t>
             </a:r>
             <a:r>
               <a:rPr lang="en-US" baseline="0" dirty="0" smtClean="0"/>
-              <a:t> cookbooks will have a </a:t>
-            </a:r>
-            <a:r>
-              <a:rPr lang="en-US" dirty="0" smtClean="0"/>
-              <a:t>metadata.rb.</a:t>
-            </a:r>
-            <a:endParaRPr lang="en-US" dirty="0"/>
+              <a:t> </a:t>
+            </a:r>
+            <a:r>
+              <a:rPr lang="en-US" dirty="0" smtClean="0"/>
+              <a:t>level as the metadata.rb.</a:t>
+            </a:r>
+          </a:p>
+          <a:p>
+            <a:r>
+              <a:rPr lang="en-US" dirty="0" smtClean="0"/>
+              <a:t/>
+            </a:r>
+            <a:br>
+              <a:rPr lang="en-US" dirty="0" smtClean="0"/>
+            </a:br>
+            <a:r>
+              <a:rPr lang="en-US" dirty="0" smtClean="0"/>
+              <a:t>├── README.md</a:t>
+            </a:r>
+            <a:br>
+              <a:rPr lang="en-US" dirty="0" smtClean="0"/>
+            </a:br>
+            <a:r>
+              <a:rPr lang="en-US" dirty="0" smtClean="0"/>
+              <a:t>├── metadata.rb</a:t>
+            </a:r>
+            <a:br>
+              <a:rPr lang="en-US" dirty="0" smtClean="0"/>
+            </a:br>
+            <a:r>
+              <a:rPr lang="en-US" dirty="0" smtClean="0"/>
+              <a:t>└── test</a:t>
+            </a:r>
+            <a:br>
+              <a:rPr lang="en-US" dirty="0" smtClean="0"/>
+            </a:br>
+            <a:r>
+              <a:rPr lang="en-US" dirty="0" smtClean="0"/>
+              <a:t>  ├── </a:t>
+            </a:r>
+            <a:r>
+              <a:rPr lang="en-US" dirty="0" err="1" smtClean="0"/>
+              <a:t>foo_spec.rb</a:t>
+            </a:r>
+            <a:r>
+              <a:rPr lang="en-US" dirty="0" smtClean="0"/>
+              <a:t/>
+            </a:r>
+            <a:br>
+              <a:rPr lang="en-US" dirty="0" smtClean="0"/>
+            </a:br>
+            <a:r>
+              <a:rPr lang="en-US" dirty="0" smtClean="0"/>
+              <a:t>  └── </a:t>
+            </a:r>
+            <a:r>
+              <a:rPr lang="en-US" dirty="0" err="1" smtClean="0"/>
+              <a:t>bar_spec.rb</a:t>
+            </a:r>
+            <a:endParaRPr lang="en-US" dirty="0" smtClean="0"/>
+          </a:p>
+          <a:p>
+            <a:endParaRPr lang="en-US" dirty="0" smtClean="0"/>
+          </a:p>
+          <a:p>
+            <a:endParaRPr lang="en-US" dirty="0" smtClean="0"/>
+          </a:p>
+          <a:p>
+            <a:endParaRPr lang="en-US" dirty="0" smtClean="0"/>
+          </a:p>
+          <a:p>
+            <a:endParaRPr lang="en-US" dirty="0" smtClean="0"/>
+          </a:p>
+          <a:p>
+            <a:r>
+              <a:rPr lang="en-US" dirty="0" smtClean="0"/>
+              <a:t>https://github.com/chef/inspec/blob/7f555b902d6860ffe236ff23e4b52f20bac28adc/lib/inspec/profile.rb#L81-L129</a:t>
+            </a:r>
+          </a:p>
+          <a:p>
+            <a:endParaRPr lang="en-US" dirty="0" smtClean="0"/>
           </a:p>
           <a:p>
             <a:pPr marL="0" marR="0" indent="0" algn="l" defTabSz="1217613" rtl="0" eaLnBrk="1" fontAlgn="base" latinLnBrk="0" hangingPunct="1">
@@ -5281,33 +5579,6 @@
               <a:tabLst/>
               <a:defRPr/>
             </a:pPr>
-            <a:r>
-              <a:rPr lang="en-US" dirty="0" smtClean="0"/>
-              <a:t>An</a:t>
-            </a:r>
-            <a:r>
-              <a:rPr lang="en-US" baseline="0" dirty="0" smtClean="0"/>
-              <a:t>d your </a:t>
-            </a:r>
-          </a:p>
-          <a:p>
-            <a:pPr marL="0" marR="0" indent="0" algn="l" defTabSz="1217613" rtl="0" eaLnBrk="1" fontAlgn="base" latinLnBrk="0" hangingPunct="1">
-              <a:lnSpc>
-                <a:spcPct val="90000"/>
-              </a:lnSpc>
-              <a:spcBef>
-                <a:spcPct val="30000"/>
-              </a:spcBef>
-              <a:spcAft>
-                <a:spcPts val="450"/>
-              </a:spcAft>
-              <a:buClrTx/>
-              <a:buSzTx/>
-              <a:buFontTx/>
-              <a:buNone/>
-              <a:tabLst/>
-              <a:defRPr/>
-            </a:pPr>
             <a:endParaRPr lang="en-US" baseline="0" dirty="0" smtClean="0"/>
           </a:p>
           <a:p>
@@ -5361,7 +5632,7 @@
                 <a:ea typeface="ＭＳ Ｐゴシック" charset="0"/>
                 <a:cs typeface="Arial" panose="020B0604020202020204" pitchFamily="34" charset="0"/>
               </a:rPr>
-              <a:t>avaialble</a:t>
+              <a:t>availalble</a:t>
             </a:r>
             <a:r>
               <a:rPr lang="en-US" sz="1200" b="0" i="0" kern="1200" dirty="0" smtClean="0">
@@ -5495,432 +5766,6 @@
                 <a:defRPr/>
               </a:pPr>
               <a:t>30</a:t>
-            </a:fld>
-            <a:endParaRPr lang="en-US" dirty="0"/>
-          </a:p>
-        </p:txBody>
-      </p:sp>
-      <p:sp>
-        <p:nvSpPr>
-          <p:cNvPr id="5" name="Header Placeholder 4"/>
-          <p:cNvSpPr>
-            <a:spLocks noGrp="1"/>
-          </p:cNvSpPr>
-          <p:nvPr>
-            <p:ph type="hdr" sz="quarter" idx="11"/>
-          </p:nvPr>
-        </p:nvSpPr>
-        <p:spPr/>
-        <p:txBody>
-          <a:bodyPr/>
-          <a:lstStyle/>
-          <a:p>
-            <a:pPr>
-              <a:defRPr/>
-            </a:pPr>
-            <a:endParaRPr lang="en-US"/>
-          </a:p>
-        </p:txBody>
-      </p:sp>
-      <p:sp>
-        <p:nvSpPr>
-          <p:cNvPr id="6" name="Footer Placeholder 5"/>
-          <p:cNvSpPr>
-            <a:spLocks noGrp="1"/>
-          </p:cNvSpPr>
-          <p:nvPr>
-            <p:ph type="ftr" sz="quarter" idx="12"/>
-          </p:nvPr>
-        </p:nvSpPr>
-        <p:spPr/>
-        <p:txBody>
-          <a:bodyPr/>
-          <a:lstStyle/>
-          <a:p>
-            <a:pPr>
-              <a:defRPr/>
-            </a:pPr>
-            <a:endParaRPr lang="en-US"/>
-          </a:p>
-        </p:txBody>
-      </p:sp>
-    </p:spTree>
-    <p:extLst>
-      <p:ext uri="{BB962C8B-B14F-4D97-AF65-F5344CB8AC3E}">
-        <p14:creationId xmlns:p14="http://schemas.microsoft.com/office/powerpoint/2010/main" val="4234763763"/>
-      </p:ext>
-    </p:extLst>
-  </p:cSld>
-  <p:clrMapOvr>
-    <a:masterClrMapping/>
-  </p:clrMapOvr>
-</p:notes>
-</file>
-
-<file path=ppt/notesSlides/notesSlide29.xml><?xml version="1.0" encoding="utf-8"?>
-<p:notes xmlns:a="http://schemas.openxmlformats.org/drawingml/2006/main" xmlns:r="http://schemas.openxmlformats.org/officeDocument/2006/relationships" xmlns:p="http://schemas.openxmlformats.org/presentationml/2006/main">
-  <p:cSld>
-    <p:spTree>
-      <p:nvGrpSpPr>
-        <p:cNvPr id="1" name=""/>
-        <p:cNvGrpSpPr/>
-        <p:nvPr/>
-      </p:nvGrpSpPr>
-      <p:grpSpPr>
-        <a:xfrm>
-          <a:off x="0" y="0"/>
-          <a:ext cx="0" cy="0"/>
-          <a:chOff x="0" y="0"/>
-          <a:chExt cx="0" cy="0"/>
-        </a:xfrm>
-      </p:grpSpPr>
-      <p:sp>
-        <p:nvSpPr>
-          <p:cNvPr id="2" name="Slide Image Placeholder 1"/>
-          <p:cNvSpPr>
-            <a:spLocks noGrp="1" noRot="1" noChangeAspect="1"/>
-          </p:cNvSpPr>
-          <p:nvPr>
-            <p:ph type="sldImg"/>
-          </p:nvPr>
-        </p:nvSpPr>
-        <p:spPr/>
-      </p:sp>
-      <p:sp>
-        <p:nvSpPr>
-          <p:cNvPr id="3" name="Notes Placeholder 2"/>
-          <p:cNvSpPr>
-            <a:spLocks noGrp="1"/>
-          </p:cNvSpPr>
-          <p:nvPr>
-            <p:ph type="body" idx="1"/>
-          </p:nvPr>
-        </p:nvSpPr>
-        <p:spPr/>
-        <p:txBody>
-          <a:bodyPr>
-            <a:normAutofit fontScale="70000" lnSpcReduction="20000"/>
-          </a:bodyPr>
-          <a:lstStyle/>
-          <a:p>
-            <a:pPr marL="0" marR="0" indent="0" algn="l" defTabSz="1217613" rtl="0" eaLnBrk="1" fontAlgn="base" latinLnBrk="0" hangingPunct="1">
-              <a:lnSpc>
-                <a:spcPct val="90000"/>
-              </a:lnSpc>
-              <a:spcBef>
-                <a:spcPct val="30000"/>
-              </a:spcBef>
-              <a:spcAft>
-                <a:spcPts val="450"/>
-              </a:spcAft>
-              <a:buClrTx/>
-              <a:buSzTx/>
-              <a:buFontTx/>
-              <a:buNone/>
-              <a:tabLst/>
-              <a:defRPr/>
-            </a:pPr>
-            <a:r>
-              <a:rPr lang="en-US" dirty="0" smtClean="0"/>
-              <a:t>The answer is, as you write controls, </a:t>
-            </a:r>
-            <a:r>
-              <a:rPr lang="en-US" dirty="0" err="1" smtClean="0"/>
-              <a:t>InSpec</a:t>
-            </a:r>
-            <a:r>
-              <a:rPr lang="en-US" dirty="0" smtClean="0"/>
-              <a:t> expects a `test` directory at the same</a:t>
-            </a:r>
-            <a:r>
-              <a:rPr lang="en-US" baseline="0" dirty="0" smtClean="0"/>
-              <a:t> </a:t>
-            </a:r>
-            <a:r>
-              <a:rPr lang="en-US" dirty="0" smtClean="0"/>
-              <a:t>level as the metadata.rb.</a:t>
-            </a:r>
-          </a:p>
-          <a:p>
-            <a:r>
-              <a:rPr lang="en-US" dirty="0" smtClean="0"/>
-              <a:t/>
-            </a:r>
-            <a:br>
-              <a:rPr lang="en-US" dirty="0" smtClean="0"/>
-            </a:br>
-            <a:r>
-              <a:rPr lang="en-US" dirty="0" smtClean="0"/>
-              <a:t>├── README.md</a:t>
-            </a:r>
-            <a:br>
-              <a:rPr lang="en-US" dirty="0" smtClean="0"/>
-            </a:br>
-            <a:r>
-              <a:rPr lang="en-US" dirty="0" smtClean="0"/>
-              <a:t>├── metadata.rb</a:t>
-            </a:r>
-            <a:br>
-              <a:rPr lang="en-US" dirty="0" smtClean="0"/>
-            </a:br>
-            <a:r>
-              <a:rPr lang="en-US" dirty="0" smtClean="0"/>
-              <a:t>└── test</a:t>
-            </a:r>
-            <a:br>
-              <a:rPr lang="en-US" dirty="0" smtClean="0"/>
-            </a:br>
-            <a:r>
-              <a:rPr lang="en-US" dirty="0" smtClean="0"/>
-              <a:t>  ├── </a:t>
-            </a:r>
-            <a:r>
-              <a:rPr lang="en-US" dirty="0" err="1" smtClean="0"/>
-              <a:t>foo_spec.rb</a:t>
-            </a:r>
-            <a:r>
-              <a:rPr lang="en-US" dirty="0" smtClean="0"/>
-              <a:t/>
-            </a:r>
-            <a:br>
-              <a:rPr lang="en-US" dirty="0" smtClean="0"/>
-            </a:br>
-            <a:r>
-              <a:rPr lang="en-US" dirty="0" smtClean="0"/>
-              <a:t>  └── </a:t>
-            </a:r>
-            <a:r>
-              <a:rPr lang="en-US" dirty="0" err="1" smtClean="0"/>
-              <a:t>bar_spec.rb</a:t>
-            </a:r>
-            <a:endParaRPr lang="en-US" dirty="0" smtClean="0"/>
-          </a:p>
-          <a:p>
-            <a:endParaRPr lang="en-US" dirty="0" smtClean="0"/>
-          </a:p>
-          <a:p>
-            <a:endParaRPr lang="en-US" dirty="0" smtClean="0"/>
-          </a:p>
-          <a:p>
-            <a:endParaRPr lang="en-US" dirty="0" smtClean="0"/>
-          </a:p>
-          <a:p>
-            <a:endParaRPr lang="en-US" dirty="0" smtClean="0"/>
-          </a:p>
-          <a:p>
-            <a:r>
-              <a:rPr lang="en-US" dirty="0" smtClean="0"/>
-              <a:t>https://github.com/chef/inspec/blob/7f555b902d6860ffe236ff23e4b52f20bac28adc/lib/inspec/profile.rb#L81-L129</a:t>
-            </a:r>
-          </a:p>
-          <a:p>
-            <a:endParaRPr lang="en-US" dirty="0" smtClean="0"/>
-          </a:p>
-          <a:p>
-            <a:pPr marL="0" marR="0" indent="0" algn="l" defTabSz="1217613" rtl="0" eaLnBrk="1" fontAlgn="base" latinLnBrk="0" hangingPunct="1">
-              <a:lnSpc>
-                <a:spcPct val="90000"/>
-              </a:lnSpc>
-              <a:spcBef>
-                <a:spcPct val="30000"/>
-              </a:spcBef>
-              <a:spcAft>
-                <a:spcPts val="450"/>
-              </a:spcAft>
-              <a:buClrTx/>
-              <a:buSzTx/>
-              <a:buFontTx/>
-              <a:buNone/>
-              <a:tabLst/>
-              <a:defRPr/>
-            </a:pPr>
-            <a:endParaRPr lang="en-US" baseline="0" dirty="0" smtClean="0"/>
-          </a:p>
-          <a:p>
-            <a:r>
-              <a:rPr lang="en-US" sz="1200" b="1" i="0" kern="1200" dirty="0" smtClean="0">
-                <a:solidFill>
-                  <a:schemeClr val="tx1"/>
-                </a:solidFill>
-                <a:effectLst/>
-                <a:latin typeface="Arial" panose="020B0604020202020204" pitchFamily="34" charset="0"/>
-                <a:ea typeface="ＭＳ Ｐゴシック" charset="0"/>
-                <a:cs typeface="Arial" panose="020B0604020202020204" pitchFamily="34" charset="0"/>
-              </a:rPr>
-              <a:t>Adding profiles</a:t>
-            </a:r>
-          </a:p>
-          <a:p>
-            <a:r>
-              <a:rPr lang="en-US" sz="1200" b="0" i="0" kern="1200" dirty="0" smtClean="0">
-                <a:solidFill>
-                  <a:schemeClr val="tx1"/>
-                </a:solidFill>
-                <a:effectLst/>
-                <a:latin typeface="Arial" panose="020B0604020202020204" pitchFamily="34" charset="0"/>
-                <a:ea typeface="ＭＳ Ｐゴシック" charset="0"/>
-                <a:cs typeface="Arial" panose="020B0604020202020204" pitchFamily="34" charset="0"/>
-              </a:rPr>
-              <a:t>Compliance profiles must be packaged in to a .tar.gz or .zip file to be uploaded to the Compliance Server. </a:t>
-            </a:r>
-          </a:p>
-          <a:p>
-            <a:r>
-              <a:rPr lang="en-US" sz="1200" b="0" i="0" kern="1200" dirty="0" smtClean="0">
-                <a:solidFill>
-                  <a:schemeClr val="tx1"/>
-                </a:solidFill>
-                <a:effectLst/>
-                <a:latin typeface="Arial" panose="020B0604020202020204" pitchFamily="34" charset="0"/>
-                <a:ea typeface="ＭＳ Ｐゴシック" charset="0"/>
-                <a:cs typeface="Arial" panose="020B0604020202020204" pitchFamily="34" charset="0"/>
-              </a:rPr>
-              <a:t>The directory structure is as follows (note, this is subject to change.  TODO: link to official docs when </a:t>
-            </a:r>
-            <a:r>
-              <a:rPr lang="en-US" sz="1200" b="0" i="0" kern="1200" dirty="0" err="1" smtClean="0">
-                <a:solidFill>
-                  <a:schemeClr val="tx1"/>
-                </a:solidFill>
-                <a:effectLst/>
-                <a:latin typeface="Arial" panose="020B0604020202020204" pitchFamily="34" charset="0"/>
-                <a:ea typeface="ＭＳ Ｐゴシック" charset="0"/>
-                <a:cs typeface="Arial" panose="020B0604020202020204" pitchFamily="34" charset="0"/>
-              </a:rPr>
-              <a:t>availalble</a:t>
-            </a:r>
-            <a:r>
-              <a:rPr lang="en-US" sz="1200" b="0" i="0" kern="1200" dirty="0" smtClean="0">
-                <a:solidFill>
-                  <a:schemeClr val="tx1"/>
-                </a:solidFill>
-                <a:effectLst/>
-                <a:latin typeface="Arial" panose="020B0604020202020204" pitchFamily="34" charset="0"/>
-                <a:ea typeface="ＭＳ Ｐゴシック" charset="0"/>
-                <a:cs typeface="Arial" panose="020B0604020202020204" pitchFamily="34" charset="0"/>
-              </a:rPr>
-              <a:t>):</a:t>
-            </a:r>
-          </a:p>
-          <a:p>
-            <a:r>
-              <a:rPr lang="en-US" sz="1200" b="0" i="0" kern="1200" dirty="0" smtClean="0">
-                <a:solidFill>
-                  <a:schemeClr val="tx1"/>
-                </a:solidFill>
-                <a:effectLst/>
-                <a:latin typeface="Arial" panose="020B0604020202020204" pitchFamily="34" charset="0"/>
-                <a:ea typeface="ＭＳ Ｐゴシック" charset="0"/>
-                <a:cs typeface="Arial" panose="020B0604020202020204" pitchFamily="34" charset="0"/>
-              </a:rPr>
-              <a:t>xyz.zip:</a:t>
-            </a:r>
-          </a:p>
-          <a:p>
-            <a:r>
-              <a:rPr lang="en-US" dirty="0" smtClean="0"/>
-              <a:t>.</a:t>
-            </a:r>
-            <a:br>
-              <a:rPr lang="en-US" dirty="0" smtClean="0"/>
-            </a:br>
-            <a:r>
-              <a:rPr lang="en-US" dirty="0" smtClean="0"/>
-              <a:t>├── README.md</a:t>
-            </a:r>
-            <a:br>
-              <a:rPr lang="en-US" dirty="0" smtClean="0"/>
-            </a:br>
-            <a:r>
-              <a:rPr lang="en-US" dirty="0" smtClean="0"/>
-              <a:t>├── metadata.rb</a:t>
-            </a:r>
-            <a:br>
-              <a:rPr lang="en-US" dirty="0" smtClean="0"/>
-            </a:br>
-            <a:r>
-              <a:rPr lang="en-US" dirty="0" smtClean="0"/>
-              <a:t>└── test</a:t>
-            </a:r>
-            <a:br>
-              <a:rPr lang="en-US" dirty="0" smtClean="0"/>
-            </a:br>
-            <a:r>
-              <a:rPr lang="en-US" dirty="0" smtClean="0"/>
-              <a:t>  ├── </a:t>
-            </a:r>
-            <a:r>
-              <a:rPr lang="en-US" dirty="0" err="1" smtClean="0"/>
-              <a:t>foo_spec.rb</a:t>
-            </a:r>
-            <a:r>
-              <a:rPr lang="en-US" dirty="0" smtClean="0"/>
-              <a:t/>
-            </a:r>
-            <a:br>
-              <a:rPr lang="en-US" dirty="0" smtClean="0"/>
-            </a:br>
-            <a:r>
-              <a:rPr lang="en-US" dirty="0" smtClean="0"/>
-              <a:t>  └── </a:t>
-            </a:r>
-            <a:r>
-              <a:rPr lang="en-US" dirty="0" err="1" smtClean="0"/>
-              <a:t>bar_spec.rb</a:t>
-            </a:r>
-            <a:endParaRPr lang="en-US" dirty="0" smtClean="0"/>
-          </a:p>
-          <a:p>
-            <a:endParaRPr lang="en-US" dirty="0" smtClean="0"/>
-          </a:p>
-          <a:p>
-            <a:r>
-              <a:rPr lang="en-US" dirty="0" smtClean="0"/>
-              <a:t>As you write controls, </a:t>
-            </a:r>
-            <a:r>
-              <a:rPr lang="en-US" dirty="0" err="1" smtClean="0"/>
-              <a:t>InSpec</a:t>
-            </a:r>
-            <a:r>
-              <a:rPr lang="en-US" dirty="0" smtClean="0"/>
-              <a:t> requires a `test` directory since it </a:t>
-            </a:r>
-            <a:r>
-              <a:rPr lang="en-US" dirty="0" err="1" smtClean="0"/>
-              <a:t>InSpec</a:t>
-            </a:r>
-            <a:r>
-              <a:rPr lang="en-US" dirty="0" smtClean="0"/>
-              <a:t> expect this structure.</a:t>
-            </a:r>
-          </a:p>
-        </p:txBody>
-      </p:sp>
-      <p:sp>
-        <p:nvSpPr>
-          <p:cNvPr id="4" name="Slide Number Placeholder 3"/>
-          <p:cNvSpPr>
-            <a:spLocks noGrp="1"/>
-          </p:cNvSpPr>
-          <p:nvPr>
-            <p:ph type="sldNum" sz="quarter" idx="10"/>
-          </p:nvPr>
-        </p:nvSpPr>
-        <p:spPr/>
-        <p:txBody>
-          <a:bodyPr/>
-          <a:lstStyle/>
-          <a:p>
-            <a:pPr>
-              <a:defRPr/>
-            </a:pPr>
-            <a:fld id="{DC3734AA-3150-D947-AC52-2F5DF48BFCD5}" type="slidenum">
-              <a:rPr lang="en-US" smtClean="0"/>
-              <a:pPr>
-                <a:defRPr/>
-              </a:pPr>
-              <a:t>31</a:t>
             </a:fld>
             <a:endParaRPr lang="en-US" dirty="0"/>
           </a:p>
@@ -6647,11 +6492,7 @@
             </a:r>
             <a:r>
               <a:rPr lang="en-US" dirty="0" smtClean="0"/>
-              <a:t> check' against </a:t>
-            </a:r>
-            <a:r>
-              <a:rPr lang="en-US" dirty="0" smtClean="0"/>
-              <a:t>the new directory.</a:t>
+              <a:t> check' against the new directory.</a:t>
             </a:r>
           </a:p>
           <a:p>
@@ -7513,15 +7354,7 @@
             </a:r>
             <a:r>
               <a:rPr lang="en-US" baseline="0" dirty="0" smtClean="0"/>
-              <a:t> the missing profile name, version, title, </a:t>
-            </a:r>
-            <a:r>
-              <a:rPr lang="en-US" baseline="0" dirty="0" smtClean="0"/>
-              <a:t>and </a:t>
-            </a:r>
-            <a:r>
-              <a:rPr lang="en-US" baseline="0" dirty="0" smtClean="0"/>
-              <a:t>maintainer values that the `</a:t>
+              <a:t> the missing profile name, version, title, and maintainer values that the `</a:t>
             </a:r>
             <a:r>
               <a:rPr lang="en-US" baseline="0" dirty="0" err="1" smtClean="0"/>
@@ -7588,11 +7421,7 @@
             </a:r>
             <a:r>
               <a:rPr lang="en-US" baseline="0" dirty="0" smtClean="0"/>
-              <a:t> by the Compliance Server</a:t>
-            </a:r>
-            <a:r>
-              <a:rPr lang="en-US" baseline="0" dirty="0" smtClean="0"/>
-              <a:t>. </a:t>
+              <a:t> by the Compliance Server. </a:t>
             </a:r>
           </a:p>
           <a:p>
@@ -7637,6 +7466,135 @@
               <a:rPr lang="en-US" baseline="0" dirty="0" smtClean="0"/>
               <a:t>You can use your own name in the `title` line and the `maintainer` line of you like.</a:t>
             </a:r>
+          </a:p>
+          <a:p>
+            <a:pPr marL="0" marR="0" indent="0" algn="l" defTabSz="1217613" rtl="0" eaLnBrk="1" fontAlgn="base" latinLnBrk="0" hangingPunct="1">
+              <a:lnSpc>
+                <a:spcPct val="90000"/>
+              </a:lnSpc>
+              <a:spcBef>
+                <a:spcPct val="30000"/>
+              </a:spcBef>
+              <a:spcAft>
+                <a:spcPts val="450"/>
+              </a:spcAft>
+              <a:buClrTx/>
+              <a:buSzTx/>
+              <a:buFontTx/>
+              <a:buNone/>
+              <a:tabLst/>
+              <a:defRPr/>
+            </a:pPr>
+            <a:endParaRPr lang="en-US" baseline="0" dirty="0" smtClean="0"/>
+          </a:p>
+          <a:p>
+            <a:r>
+              <a:rPr lang="en-US" b="1" baseline="0" dirty="0" smtClean="0"/>
+              <a:t>Note</a:t>
+            </a:r>
+            <a:r>
+              <a:rPr lang="en-US" baseline="0" dirty="0" smtClean="0"/>
+              <a:t>: In the workplace you may want to make the </a:t>
+            </a:r>
+            <a:r>
+              <a:rPr lang="en-US" dirty="0" smtClean="0"/>
+              <a:t>name '</a:t>
+            </a:r>
+            <a:r>
+              <a:rPr lang="en-US" dirty="0" err="1" smtClean="0"/>
+              <a:t>myname</a:t>
+            </a:r>
+            <a:r>
+              <a:rPr lang="en-US" dirty="0" smtClean="0"/>
+              <a:t>/profile' value more descriptive so it will be unique.</a:t>
+            </a:r>
+            <a:r>
+              <a:rPr lang="en-US" baseline="0" dirty="0" smtClean="0"/>
+              <a:t> For example:</a:t>
+            </a:r>
+          </a:p>
+          <a:p>
+            <a:endParaRPr lang="en-US" baseline="0" dirty="0" smtClean="0"/>
+          </a:p>
+          <a:p>
+            <a:r>
+              <a:rPr lang="en-US" dirty="0" smtClean="0"/>
+              <a:t>name '</a:t>
+            </a:r>
+            <a:r>
+              <a:rPr lang="en-US" dirty="0" err="1" smtClean="0"/>
+              <a:t>myname</a:t>
+            </a:r>
+            <a:r>
+              <a:rPr lang="en-US" dirty="0" smtClean="0"/>
+              <a:t>/</a:t>
+            </a:r>
+            <a:r>
+              <a:rPr lang="en-US" dirty="0" err="1" smtClean="0"/>
+              <a:t>XYZprofile</a:t>
+            </a:r>
+            <a:r>
+              <a:rPr lang="en-US" dirty="0" smtClean="0"/>
+              <a:t>'.</a:t>
+            </a:r>
+            <a:r>
+              <a:rPr lang="en-US" baseline="0" dirty="0" smtClean="0"/>
+              <a:t> This is because the </a:t>
+            </a:r>
+            <a:r>
+              <a:rPr lang="en-US" dirty="0" smtClean="0"/>
+              <a:t>'</a:t>
+            </a:r>
+            <a:r>
+              <a:rPr lang="en-US" dirty="0" err="1" smtClean="0"/>
+              <a:t>myname</a:t>
+            </a:r>
+            <a:r>
+              <a:rPr lang="en-US" dirty="0" smtClean="0"/>
+              <a:t>" portion will be substituted by the user name you are using when you upload such</a:t>
+            </a:r>
+            <a:r>
+              <a:rPr lang="en-US" baseline="0" dirty="0" smtClean="0"/>
+              <a:t> a profile to the Compliance Server. For example, if you log into the Compliance Server as `admin`, then all profiles uploaded using the `</a:t>
+            </a:r>
+            <a:r>
+              <a:rPr lang="en-US" baseline="0" dirty="0" err="1" smtClean="0"/>
+              <a:t>myname</a:t>
+            </a:r>
+            <a:r>
+              <a:rPr lang="en-US" baseline="0" dirty="0" smtClean="0"/>
+              <a:t>` namespace will have `admin` in place of '</a:t>
+            </a:r>
+            <a:r>
+              <a:rPr lang="en-US" baseline="0" dirty="0" err="1" smtClean="0"/>
+              <a:t>myname</a:t>
+            </a:r>
+            <a:r>
+              <a:rPr lang="en-US" baseline="0" dirty="0" smtClean="0"/>
+              <a:t>'.</a:t>
+            </a:r>
+          </a:p>
+          <a:p>
+            <a:endParaRPr lang="en-US" dirty="0" smtClean="0"/>
+          </a:p>
+          <a:p>
+            <a:pPr marL="0" marR="0" indent="0" algn="l" defTabSz="1217613" rtl="0" eaLnBrk="1" fontAlgn="base" latinLnBrk="0" hangingPunct="1">
+              <a:lnSpc>
+                <a:spcPct val="90000"/>
+              </a:lnSpc>
+              <a:spcBef>
+                <a:spcPct val="30000"/>
+              </a:spcBef>
+              <a:spcAft>
+                <a:spcPts val="450"/>
+              </a:spcAft>
+              <a:buClrTx/>
+              <a:buSzTx/>
+              <a:buFontTx/>
+              <a:buNone/>
+              <a:tabLst/>
+              <a:defRPr/>
+            </a:pPr>
             <a:endParaRPr lang="en-US" dirty="0" smtClean="0"/>
           </a:p>
           <a:p>
@@ -18075,11 +18033,7 @@
           <a:p>
             <a:r>
               <a:rPr lang="en-US" dirty="0" smtClean="0"/>
-              <a:t>GE: </a:t>
-            </a:r>
-            <a:r>
-              <a:rPr lang="en-US" dirty="0" smtClean="0"/>
-              <a:t>Use `</a:t>
+              <a:t>GE: Use `</a:t>
             </a:r>
             <a:r>
               <a:rPr lang="en-US" dirty="0" err="1" smtClean="0"/>
@@ -18495,11 +18449,7 @@
             </a:r>
             <a:r>
               <a:rPr lang="en-US" dirty="0" smtClean="0"/>
-              <a:t>ompliance </a:t>
-            </a:r>
-            <a:r>
-              <a:rPr lang="en-US" dirty="0" smtClean="0"/>
-              <a:t>profile</a:t>
+              <a:t>ompliance profile</a:t>
             </a:r>
           </a:p>
           <a:p>
@@ -20193,14 +20143,12 @@
         </p:nvSpPr>
         <p:spPr/>
         <p:txBody>
-          <a:bodyPr>
-            <a:normAutofit/>
-          </a:bodyPr>
+          <a:bodyPr/>
           <a:lstStyle/>
           <a:p>
             <a:r>
               <a:rPr lang="en-US" dirty="0" smtClean="0"/>
-              <a:t>GE: Results of the Custom Profile Scan</a:t>
+              <a:t>GE: Save this</a:t>
             </a:r>
             <a:endParaRPr lang="en-US" dirty="0"/>
           </a:p>
@@ -20218,27 +20166,30 @@
         </p:nvSpPr>
         <p:spPr>
           <a:xfrm>
-            <a:off x="297180" y="1856198"/>
-            <a:ext cx="15544800" cy="5345953"/>
+            <a:off x="609599" y="1559018"/>
+            <a:ext cx="14042065" cy="5961922"/>
           </a:xfrm>
         </p:spPr>
         <p:txBody>
           <a:bodyPr/>
           <a:lstStyle/>
-          <a:p>
-            <a:r>
-              <a:rPr lang="en-US" dirty="0" smtClean="0"/>
-              <a:t>You should also be able to see your custom profile from your Compliance page.</a:t>
-            </a:r>
-          </a:p>
           <a:p>
             <a:pPr marL="457200" indent="-457200">
               <a:buFont typeface="Arial" panose="020B0604020202020204" pitchFamily="34" charset="0"/>
               <a:buChar char="•"/>
             </a:pPr>
-            <a:endParaRPr lang="en-US" dirty="0"/>
-          </a:p>
-          <a:p>
+            <a:r>
+              <a:rPr lang="en-US" dirty="0">
+                <a:hlinkClick r:id="rId3"/>
+              </a:rPr>
+              <a:t>https://</a:t>
+            </a:r>
+            <a:r>
+              <a:rPr lang="en-US" dirty="0" smtClean="0">
+                <a:hlinkClick r:id="rId3"/>
+              </a:rPr>
+              <a:t>github.com/chef/inspec/blob/7f555b902d6860ffe236ff23e4b52f20bac28adc/lib/inspec/profile.rb#L81-L129</a:t>
+            </a:r>
             <a:endParaRPr lang="en-US" dirty="0" smtClean="0"/>
           </a:p>
           <a:p>
@@ -20248,12 +20199,99 @@
             </a:pPr>
             <a:endParaRPr lang="en-US" dirty="0"/>
           </a:p>
+          <a:p>
+            <a:pPr marL="457200" indent="-457200">
+              <a:buFont typeface="Arial" panose="020B0604020202020204" pitchFamily="34" charset="0"/>
+              <a:buChar char="•"/>
+            </a:pPr>
+            <a:endParaRPr lang="en-US" dirty="0" smtClean="0"/>
+          </a:p>
+          <a:p>
+            <a:pPr marL="457200" indent="-457200">
+              <a:buFont typeface="Arial" panose="020B0604020202020204" pitchFamily="34" charset="0"/>
+              <a:buChar char="•"/>
+            </a:pPr>
+            <a:r>
+              <a:rPr lang="en-US" dirty="0" smtClean="0"/>
+              <a:t>and Check uses the </a:t>
+            </a:r>
+            <a:r>
+              <a:rPr lang="en-US" dirty="0"/>
+              <a:t>above from here:</a:t>
+            </a:r>
+            <a:br>
+              <a:rPr lang="en-US" dirty="0"/>
+            </a:br>
+            <a:r>
+              <a:rPr lang="en-US" dirty="0">
+                <a:hlinkClick r:id="rId4"/>
+              </a:rPr>
+              <a:t>https://</a:t>
+            </a:r>
+            <a:r>
+              <a:rPr lang="en-US" dirty="0" smtClean="0">
+                <a:hlinkClick r:id="rId4"/>
+              </a:rPr>
+              <a:t>github.com/chef/inspec/blob/b1ec95e343aac75ee1a21e3d1a09a32a5a8c1dd2/bin/inspec#L70-L78</a:t>
+            </a:r>
+            <a:endParaRPr lang="en-US" dirty="0" smtClean="0"/>
+          </a:p>
+          <a:p>
+            <a:pPr marL="457200" indent="-457200">
+              <a:buFont typeface="Arial" panose="020B0604020202020204" pitchFamily="34" charset="0"/>
+              <a:buChar char="•"/>
+            </a:pPr>
+            <a:endParaRPr lang="en-US" dirty="0"/>
+          </a:p>
+          <a:p>
+            <a:pPr marL="457200" indent="-457200">
+              <a:buFont typeface="Arial" panose="020B0604020202020204" pitchFamily="34" charset="0"/>
+              <a:buChar char="•"/>
+            </a:pPr>
+            <a:r>
+              <a:rPr lang="en-US" dirty="0">
+                <a:hlinkClick r:id="rId5"/>
+              </a:rPr>
+              <a:t>https://</a:t>
+            </a:r>
+            <a:r>
+              <a:rPr lang="en-US" dirty="0" smtClean="0">
+                <a:hlinkClick r:id="rId5"/>
+              </a:rPr>
+              <a:t>chefio.atlassian.net/wiki/pages/viewpage.action?spaceKey=SE&amp;title=Week+1#Week1-Addingprofiles</a:t>
+            </a:r>
+            <a:endParaRPr lang="en-US" dirty="0" smtClean="0"/>
+          </a:p>
+          <a:p>
+            <a:pPr marL="457200" indent="-457200">
+              <a:buFont typeface="Arial" panose="020B0604020202020204" pitchFamily="34" charset="0"/>
+              <a:buChar char="•"/>
+            </a:pPr>
+            <a:endParaRPr lang="en-US" dirty="0" smtClean="0"/>
+          </a:p>
+          <a:p>
+            <a:pPr marL="457200" indent="-457200">
+              <a:buFont typeface="Arial" panose="020B0604020202020204" pitchFamily="34" charset="0"/>
+              <a:buChar char="•"/>
+            </a:pPr>
+            <a:endParaRPr lang="en-US" dirty="0"/>
+          </a:p>
+          <a:p>
+            <a:endParaRPr lang="en-US" dirty="0" smtClean="0"/>
+          </a:p>
+          <a:p>
+            <a:pPr marL="457200" indent="-457200">
+              <a:buFont typeface="Arial" panose="020B0604020202020204" pitchFamily="34" charset="0"/>
+              <a:buChar char="•"/>
+            </a:pPr>
+            <a:endParaRPr lang="en-US" dirty="0"/>
+          </a:p>
         </p:txBody>
       </p:sp>
     </p:spTree>
     <p:extLst>
       <p:ext uri="{BB962C8B-B14F-4D97-AF65-F5344CB8AC3E}">
-        <p14:creationId xmlns:p14="http://schemas.microsoft.com/office/powerpoint/2010/main" val="3148571265"/>
+        <p14:creationId xmlns:p14="http://schemas.microsoft.com/office/powerpoint/2010/main" val="420890300"/>
       </p:ext>
     </p:extLst>
   </p:cSld>
@@ -20414,203 +20452,6 @@
         </p:nvSpPr>
         <p:spPr/>
         <p:txBody>
-          <a:bodyPr/>
-          <a:lstStyle/>
-          <a:p>
-            <a:r>
-              <a:rPr lang="en-US" dirty="0" smtClean="0"/>
-              <a:t>GE: Save this</a:t>
-            </a:r>
-            <a:endParaRPr lang="en-US" dirty="0"/>
-          </a:p>
-        </p:txBody>
-      </p:sp>
-      <p:sp>
-        <p:nvSpPr>
-          <p:cNvPr id="6" name="Text Placeholder 2"/>
-          <p:cNvSpPr>
-            <a:spLocks noGrp="1"/>
-          </p:cNvSpPr>
-          <p:nvPr>
-            <p:ph type="body" sz="quarter" idx="12"/>
-          </p:nvPr>
-        </p:nvSpPr>
-        <p:spPr>
-          <a:xfrm>
-            <a:off x="609599" y="1559018"/>
-            <a:ext cx="14042065" cy="5961922"/>
-          </a:xfrm>
-        </p:spPr>
-        <p:txBody>
-          <a:bodyPr/>
-          <a:lstStyle/>
-          <a:p>
-            <a:pPr marL="457200" indent="-457200">
-              <a:buFont typeface="Arial" panose="020B0604020202020204" pitchFamily="34" charset="0"/>
-              <a:buChar char="•"/>
-            </a:pPr>
-            <a:r>
-              <a:rPr lang="en-US" dirty="0">
-                <a:hlinkClick r:id="rId3"/>
-              </a:rPr>
-              <a:t>https://</a:t>
-            </a:r>
-            <a:r>
-              <a:rPr lang="en-US" dirty="0" smtClean="0">
-                <a:hlinkClick r:id="rId3"/>
-              </a:rPr>
-              <a:t>github.com/chef/inspec/blob/7f555b902d6860ffe236ff23e4b52f20bac28adc/lib/inspec/profile.rb#L81-L129</a:t>
-            </a:r>
-            <a:endParaRPr lang="en-US" dirty="0" smtClean="0"/>
-          </a:p>
-          <a:p>
-            <a:pPr marL="457200" indent="-457200">
-              <a:buFont typeface="Arial" panose="020B0604020202020204" pitchFamily="34" charset="0"/>
-              <a:buChar char="•"/>
-            </a:pPr>
-            <a:endParaRPr lang="en-US" dirty="0"/>
-          </a:p>
-          <a:p>
-            <a:pPr marL="457200" indent="-457200">
-              <a:buFont typeface="Arial" panose="020B0604020202020204" pitchFamily="34" charset="0"/>
-              <a:buChar char="•"/>
-            </a:pPr>
-            <a:endParaRPr lang="en-US" dirty="0" smtClean="0"/>
-          </a:p>
-          <a:p>
-            <a:pPr marL="457200" indent="-457200">
-              <a:buFont typeface="Arial" panose="020B0604020202020204" pitchFamily="34" charset="0"/>
-              <a:buChar char="•"/>
-            </a:pPr>
-            <a:r>
-              <a:rPr lang="en-US" dirty="0" smtClean="0"/>
-              <a:t>and Check uses the </a:t>
-            </a:r>
-            <a:r>
-              <a:rPr lang="en-US" dirty="0"/>
-              <a:t>above from here:</a:t>
-            </a:r>
-            <a:br>
-              <a:rPr lang="en-US" dirty="0"/>
-            </a:br>
-            <a:r>
-              <a:rPr lang="en-US" dirty="0">
-                <a:hlinkClick r:id="rId4"/>
-              </a:rPr>
-              <a:t>https://</a:t>
-            </a:r>
-            <a:r>
-              <a:rPr lang="en-US" dirty="0" smtClean="0">
-                <a:hlinkClick r:id="rId4"/>
-              </a:rPr>
-              <a:t>github.com/chef/inspec/blob/b1ec95e343aac75ee1a21e3d1a09a32a5a8c1dd2/bin/inspec#L70-L78</a:t>
-            </a:r>
-            <a:endParaRPr lang="en-US" dirty="0" smtClean="0"/>
-          </a:p>
-          <a:p>
-            <a:pPr marL="457200" indent="-457200">
-              <a:buFont typeface="Arial" panose="020B0604020202020204" pitchFamily="34" charset="0"/>
-              <a:buChar char="•"/>
-            </a:pPr>
-            <a:endParaRPr lang="en-US" dirty="0"/>
-          </a:p>
-          <a:p>
-            <a:pPr marL="457200" indent="-457200">
-              <a:buFont typeface="Arial" panose="020B0604020202020204" pitchFamily="34" charset="0"/>
-              <a:buChar char="•"/>
-            </a:pPr>
-            <a:r>
-              <a:rPr lang="en-US" dirty="0">
-                <a:hlinkClick r:id="rId5"/>
-              </a:rPr>
-              <a:t>https://</a:t>
-            </a:r>
-            <a:r>
-              <a:rPr lang="en-US" dirty="0" smtClean="0">
-                <a:hlinkClick r:id="rId5"/>
-              </a:rPr>
-              <a:t>chefio.atlassian.net/wiki/pages/viewpage.action?spaceKey=SE&amp;title=Week+1#Week1-Addingprofiles</a:t>
-            </a:r>
-            <a:endParaRPr lang="en-US" dirty="0" smtClean="0"/>
-          </a:p>
-          <a:p>
-            <a:pPr marL="457200" indent="-457200">
-              <a:buFont typeface="Arial" panose="020B0604020202020204" pitchFamily="34" charset="0"/>
-              <a:buChar char="•"/>
-            </a:pPr>
-            <a:endParaRPr lang="en-US" dirty="0" smtClean="0"/>
-          </a:p>
-          <a:p>
-            <a:pPr marL="457200" indent="-457200">
-              <a:buFont typeface="Arial" panose="020B0604020202020204" pitchFamily="34" charset="0"/>
-              <a:buChar char="•"/>
-            </a:pPr>
-            <a:endParaRPr lang="en-US" dirty="0"/>
-          </a:p>
-          <a:p>
-            <a:endParaRPr lang="en-US" dirty="0" smtClean="0"/>
-          </a:p>
-          <a:p>
-            <a:pPr marL="457200" indent="-457200">
-              <a:buFont typeface="Arial" panose="020B0604020202020204" pitchFamily="34" charset="0"/>
-              <a:buChar char="•"/>
-            </a:pPr>
-            <a:endParaRPr lang="en-US" dirty="0"/>
-          </a:p>
-        </p:txBody>
-      </p:sp>
-    </p:spTree>
-    <p:extLst>
-      <p:ext uri="{BB962C8B-B14F-4D97-AF65-F5344CB8AC3E}">
-        <p14:creationId xmlns:p14="http://schemas.microsoft.com/office/powerpoint/2010/main" val="420890300"/>
-      </p:ext>
-    </p:extLst>
-  </p:cSld>
-  <p:clrMapOvr>
-    <a:masterClrMapping/>
-  </p:clrMapOvr>
-  <p:transition spd="med">
-    <p:fade/>
-  </p:transition>
-  <p:timing>
-    <p:tnLst>
-      <p:par>
-        <p:cTn id="1" dur="indefinite" restart="never" nodeType="tmRoot"/>
-      </p:par>
-    </p:tnLst>
-  </p:timing>
-</p:sld>
-</file>
-
-<file path=ppt/slides/slide31.xml><?xml version="1.0" encoding="utf-8"?>
-<p:sld xmlns:a="http://schemas.openxmlformats.org/drawingml/2006/main" xmlns:r="http://schemas.openxmlformats.org/officeDocument/2006/relationships" xmlns:p="http://schemas.openxmlformats.org/presentationml/2006/main">
-  <p:cSld>
-    <p:spTree>
-      <p:nvGrpSpPr>
-        <p:cNvPr id="1" name=""/>
-        <p:cNvGrpSpPr/>
-        <p:nvPr/>
-      </p:nvGrpSpPr>
-      <p:grpSpPr>
-        <a:xfrm>
-          <a:off x="0" y="0"/>
-          <a:ext cx="0" cy="0"/>
-          <a:chOff x="0" y="0"/>
-          <a:chExt cx="0" cy="0"/>
-        </a:xfrm>
-      </p:grpSpPr>
-      <p:sp>
-        <p:nvSpPr>
-          <p:cNvPr id="2" name="Title 1"/>
-          <p:cNvSpPr>
-            <a:spLocks noGrp="1"/>
-          </p:cNvSpPr>
-          <p:nvPr>
-            <p:ph type="title"/>
-          </p:nvPr>
-        </p:nvSpPr>
-        <p:spPr/>
-        <p:txBody>
           <a:bodyPr>
             <a:normAutofit/>
           </a:bodyPr>
@@ -20788,7 +20629,7 @@
 </p:sld>
 </file>
 
-<file path=ppt/slides/slide32.xml><?xml version="1.0" encoding="utf-8"?>
+<file path=ppt/slides/slide31.xml><?xml version="1.0" encoding="utf-8"?>
 <p:sld xmlns:a="http://schemas.openxmlformats.org/drawingml/2006/main" xmlns:r="http://schemas.openxmlformats.org/officeDocument/2006/relationships" xmlns:p="http://schemas.openxmlformats.org/presentationml/2006/main">
   <p:cSld>
     <p:bg>
@@ -20968,7 +20809,7 @@
 </p:sld>
 </file>
 
-<file path=ppt/slides/slide33.xml><?xml version="1.0" encoding="utf-8"?>
+<file path=ppt/slides/slide32.xml><?xml version="1.0" encoding="utf-8"?>
 <p:sld xmlns:a="http://schemas.openxmlformats.org/drawingml/2006/main" xmlns:r="http://schemas.openxmlformats.org/officeDocument/2006/relationships" xmlns:p="http://schemas.openxmlformats.org/presentationml/2006/main">
   <p:cSld>
     <p:spTree>
@@ -21230,11 +21071,7 @@
           <a:p>
             <a:r>
               <a:rPr lang="en-US" dirty="0" smtClean="0"/>
-              <a:t>In this section we will </a:t>
-            </a:r>
-            <a:r>
-              <a:rPr lang="en-US" dirty="0" smtClean="0"/>
-              <a:t>use the </a:t>
+              <a:t>In this section we will use the </a:t>
             </a:r>
             <a:r>
               <a:rPr lang="en-US" dirty="0" err="1" smtClean="0"/>
@@ -21242,11 +21079,7 @@
             </a:r>
             <a:r>
               <a:rPr lang="en-US" dirty="0" smtClean="0"/>
-              <a:t> CLI to </a:t>
-            </a:r>
-            <a:r>
-              <a:rPr lang="en-US" dirty="0" smtClean="0"/>
-              <a:t>run </a:t>
+              <a:t> CLI to run </a:t>
             </a:r>
             <a:r>
               <a:rPr lang="en-US" dirty="0"/>
@@ -21511,15 +21344,7 @@
             </a:pPr>
             <a:r>
               <a:rPr lang="en-US" dirty="0" smtClean="0"/>
-              <a:t>Create </a:t>
-            </a:r>
-            <a:r>
-              <a:rPr lang="en-US" dirty="0" smtClean="0"/>
-              <a:t>a custom profile</a:t>
-            </a:r>
-            <a:r>
-              <a:rPr lang="en-US" dirty="0" smtClean="0"/>
-              <a:t>.</a:t>
+              <a:t>Create a custom profile.</a:t>
             </a:r>
           </a:p>
           <a:p>
@@ -21885,11 +21710,7 @@
           <a:p>
             <a:r>
               <a:rPr lang="en-US" dirty="0" smtClean="0"/>
-              <a:t>GE: Run </a:t>
-            </a:r>
-            <a:r>
-              <a:rPr lang="en-US" dirty="0" smtClean="0"/>
-              <a:t>`</a:t>
+              <a:t>GE: Run `</a:t>
             </a:r>
             <a:r>
               <a:rPr lang="en-US" dirty="0" err="1" smtClean="0"/>
@@ -23727,15 +23548,6 @@
 </file>
 
 <file path=customXml/item1.xml><?xml version="1.0" encoding="utf-8"?>
-<?mso-contentType ?>
-<FormTemplates xmlns="http://schemas.microsoft.com/sharepoint/v3/contenttype/forms">
-  <Display>DocumentLibraryForm</Display>
-  <Edit>DocumentLibraryForm</Edit>
-  <New>DocumentLibraryForm</New>
-</FormTemplates>
-</file>
-
-<file path=customXml/item2.xml><?xml version="1.0" encoding="utf-8"?>
 <p:properties xmlns:p="http://schemas.microsoft.com/office/2006/metadata/properties" xmlns:xsi="http://www.w3.org/2001/XMLSchema-instance" xmlns:pc="http://schemas.microsoft.com/office/infopath/2007/PartnerControls">
   <documentManagement>
     <_dlc_DocId xmlns="7bb5d761-a2ea-4873-95f7-7a6658fb3ef0">M4CWTKMW727E-592-73</_dlc_DocId>
@@ -23747,7 +23559,7 @@
 </p:properties>
 </file>
 
-<file path=customXml/item3.xml><?xml version="1.0" encoding="utf-8"?>
+<file path=customXml/item2.xml><?xml version="1.0" encoding="utf-8"?>
 <ct:contentTypeSchema xmlns:ct="http://schemas.microsoft.com/office/2006/metadata/contentType" xmlns:ma="http://schemas.microsoft.com/office/2006/metadata/properties/metaAttributes" ct:_="" ma:_="" ma:contentTypeName="Document" ma:contentTypeID="0x0101000812F700BE7F874999720E88173FE491" ma:contentTypeVersion="0" ma:contentTypeDescription="Create a new document." ma:contentTypeScope="" ma:versionID="3f79f408e2ca720b7aba6e0e32464d0c">
   <xsd:schema xmlns:xsd="http://www.w3.org/2001/XMLSchema" xmlns:xs="http://www.w3.org/2001/XMLSchema" xmlns:p="http://schemas.microsoft.com/office/2006/metadata/properties" xmlns:ns2="7bb5d761-a2ea-4873-95f7-7a6658fb3ef0" targetNamespace="http://schemas.microsoft.com/office/2006/metadata/properties" ma:root="true" ma:fieldsID="1e062cd38ba31e406bfc4340fbc7f87a" ns2:_="">
     <xsd:import namespace="7bb5d761-a2ea-4873-95f7-7a6658fb3ef0"/>
@@ -23892,7 +23704,7 @@
 </ct:contentTypeSchema>
 </file>
 
-<file path=customXml/item4.xml><?xml version="1.0" encoding="utf-8"?>
+<file path=customXml/item3.xml><?xml version="1.0" encoding="utf-8"?>
 <?mso-contentType ?>
 <spe:Receivers xmlns:spe="http://schemas.microsoft.com/sharepoint/events">
   <Receiver>
@@ -23938,15 +23750,16 @@
 </spe:Receivers>
 </file>
 
-<file path=customXml/itemProps1.xml><?xml version="1.0" encoding="utf-8"?>
-<ds:datastoreItem xmlns:ds="http://schemas.openxmlformats.org/officeDocument/2006/customXml" ds:itemID="{5CDEB364-43EC-4510-9881-539C2A3FCE9E}">
-  <ds:schemaRefs>
-    <ds:schemaRef ds:uri="http://schemas.microsoft.com/sharepoint/v3/contenttype/forms"/>
-  </ds:schemaRefs>
-</ds:datastoreItem>
+<file path=customXml/item4.xml><?xml version="1.0" encoding="utf-8"?>
+<?mso-contentType ?>
+<FormTemplates xmlns="http://schemas.microsoft.com/sharepoint/v3/contenttype/forms">
+  <Display>DocumentLibraryForm</Display>
+  <Edit>DocumentLibraryForm</Edit>
+  <New>DocumentLibraryForm</New>
+</FormTemplates>
 </file>
 
-<file path=customXml/itemProps2.xml><?xml version="1.0" encoding="utf-8"?>
+<file path=customXml/itemProps1.xml><?xml version="1.0" encoding="utf-8"?>
 <ds:datastoreItem xmlns:ds="http://schemas.openxmlformats.org/officeDocument/2006/customXml" ds:itemID="{6921749B-AEB7-461B-845F-603CABD25259}">
   <ds:schemaRefs>
     <ds:schemaRef ds:uri="http://schemas.microsoft.com/office/2006/documentManagement/types"/>
@@ -23962,7 +23775,7 @@
 </ds:datastoreItem>
 </file>
 
-<file path=customXml/itemProps3.xml><?xml version="1.0" encoding="utf-8"?>
+<file path=customXml/itemProps2.xml><?xml version="1.0" encoding="utf-8"?>
 <ds:datastoreItem xmlns:ds="http://schemas.openxmlformats.org/officeDocument/2006/customXml" ds:itemID="{164479E5-0B02-49AC-B79E-EC1D6164DDD3}">
   <ds:schemaRefs>
     <ds:schemaRef ds:uri="http://schemas.microsoft.com/office/2006/metadata/contentType"/>
@@ -23980,10 +23793,18 @@
 </ds:datastoreItem>
 </file>
 
-<file path=customXml/itemProps4.xml><?xml version="1.0" encoding="utf-8"?>
+<file path=customXml/itemProps3.xml><?xml version="1.0" encoding="utf-8"?>
 <ds:datastoreItem xmlns:ds="http://schemas.openxmlformats.org/officeDocument/2006/customXml" ds:itemID="{B13EBC30-FE27-4C6A-B723-23FC2188F7DC}">
   <ds:schemaRefs>
     <ds:schemaRef ds:uri="http://schemas.microsoft.com/sharepoint/events"/>
   </ds:schemaRefs>
 </ds:datastoreItem>
+</file>
+
+<file path=customXml/itemProps4.xml><?xml version="1.0" encoding="utf-8"?>
+<ds:datastoreItem xmlns:ds="http://schemas.openxmlformats.org/officeDocument/2006/customXml" ds:itemID="{5CDEB364-43EC-4510-9881-539C2A3FCE9E}">
+  <ds:schemaRefs>
+    <ds:schemaRef ds:uri="http://schemas.microsoft.com/sharepoint/v3/contenttype/forms"/>
+  </ds:schemaRefs>
+</ds:datastoreItem>
 </file>
</xml_diff>